<commit_message>
add hw5 handwrite and final paper file
</commit_message>
<xml_diff>
--- a/Final Project/Final Paper/HO-Machine learning workflows.pptx
+++ b/Final Project/Final Paper/HO-Machine learning workflows.pptx
@@ -5,10 +5,10 @@
     <p:sldMasterId id="2147483648" r:id="rId1"/>
   </p:sldMasterIdLst>
   <p:notesMasterIdLst>
-    <p:notesMasterId r:id="rId17"/>
+    <p:notesMasterId r:id="rId19"/>
   </p:notesMasterIdLst>
   <p:handoutMasterIdLst>
-    <p:handoutMasterId r:id="rId18"/>
+    <p:handoutMasterId r:id="rId20"/>
   </p:handoutMasterIdLst>
   <p:sldIdLst>
     <p:sldId id="256" r:id="rId2"/>
@@ -21,11 +21,13 @@
     <p:sldId id="319" r:id="rId9"/>
     <p:sldId id="290" r:id="rId10"/>
     <p:sldId id="291" r:id="rId11"/>
-    <p:sldId id="310" r:id="rId12"/>
-    <p:sldId id="314" r:id="rId13"/>
-    <p:sldId id="295" r:id="rId14"/>
-    <p:sldId id="296" r:id="rId15"/>
-    <p:sldId id="288" r:id="rId16"/>
+    <p:sldId id="322" r:id="rId12"/>
+    <p:sldId id="310" r:id="rId13"/>
+    <p:sldId id="321" r:id="rId14"/>
+    <p:sldId id="314" r:id="rId15"/>
+    <p:sldId id="295" r:id="rId16"/>
+    <p:sldId id="296" r:id="rId17"/>
+    <p:sldId id="288" r:id="rId18"/>
   </p:sldIdLst>
   <p:sldSz cx="12192000" cy="6858000"/>
   <p:notesSz cx="6858000" cy="9144000"/>
@@ -139,7 +141,9 @@
             <p14:sldId id="319"/>
             <p14:sldId id="290"/>
             <p14:sldId id="291"/>
+            <p14:sldId id="322"/>
             <p14:sldId id="310"/>
+            <p14:sldId id="321"/>
             <p14:sldId id="314"/>
             <p14:sldId id="295"/>
             <p14:sldId id="296"/>
@@ -2646,6 +2650,281 @@
 </p:notes>
 </file>
 
+<file path=ppt/notesSlides/notesSlide10.xml><?xml version="1.0" encoding="utf-8"?>
+<p:notes xmlns:a="http://schemas.openxmlformats.org/drawingml/2006/main" xmlns:r="http://schemas.openxmlformats.org/officeDocument/2006/relationships" xmlns:p="http://schemas.openxmlformats.org/presentationml/2006/main">
+  <p:cSld>
+    <p:spTree>
+      <p:nvGrpSpPr>
+        <p:cNvPr id="1" name=""/>
+        <p:cNvGrpSpPr/>
+        <p:nvPr/>
+      </p:nvGrpSpPr>
+      <p:grpSpPr>
+        <a:xfrm>
+          <a:off x="0" y="0"/>
+          <a:ext cx="0" cy="0"/>
+          <a:chOff x="0" y="0"/>
+          <a:chExt cx="0" cy="0"/>
+        </a:xfrm>
+      </p:grpSpPr>
+      <p:sp>
+        <p:nvSpPr>
+          <p:cNvPr id="2" name="投影片影像版面配置區 1"/>
+          <p:cNvSpPr>
+            <a:spLocks noGrp="1" noRot="1" noChangeAspect="1"/>
+          </p:cNvSpPr>
+          <p:nvPr>
+            <p:ph type="sldImg"/>
+          </p:nvPr>
+        </p:nvSpPr>
+        <p:spPr/>
+      </p:sp>
+      <p:sp>
+        <p:nvSpPr>
+          <p:cNvPr id="3" name="備忘稿版面配置區 2"/>
+          <p:cNvSpPr>
+            <a:spLocks noGrp="1"/>
+          </p:cNvSpPr>
+          <p:nvPr>
+            <p:ph type="body" idx="1"/>
+          </p:nvPr>
+        </p:nvSpPr>
+        <p:spPr/>
+        <p:txBody>
+          <a:bodyPr/>
+          <a:lstStyle/>
+          <a:p>
+            <a:pPr marL="171450" indent="-171450">
+              <a:buFont typeface="Arial" panose="020B0604020202020204" pitchFamily="34" charset="0"/>
+              <a:buChar char="•"/>
+            </a:pPr>
+            <a:endParaRPr lang="en-US" altLang="zh-TW" baseline="0" dirty="0">
+              <a:latin typeface="Times New Roman" panose="02020603050405020304" pitchFamily="18" charset="0"/>
+              <a:ea typeface="標楷體" panose="03000509000000000000" pitchFamily="65" charset="-120"/>
+              <a:cs typeface="Times New Roman" panose="02020603050405020304" pitchFamily="18" charset="0"/>
+            </a:endParaRPr>
+          </a:p>
+        </p:txBody>
+      </p:sp>
+      <p:sp>
+        <p:nvSpPr>
+          <p:cNvPr id="4" name="投影片編號版面配置區 3"/>
+          <p:cNvSpPr>
+            <a:spLocks noGrp="1"/>
+          </p:cNvSpPr>
+          <p:nvPr>
+            <p:ph type="sldNum" sz="quarter" idx="5"/>
+          </p:nvPr>
+        </p:nvSpPr>
+        <p:spPr/>
+        <p:txBody>
+          <a:bodyPr/>
+          <a:lstStyle/>
+          <a:p>
+            <a:fld id="{CA802C15-8439-4650-9275-89E8E467F89F}" type="slidenum">
+              <a:rPr lang="zh-TW" altLang="en-US" smtClean="0"/>
+              <a:t>12</a:t>
+            </a:fld>
+            <a:endParaRPr lang="zh-TW" altLang="en-US"/>
+          </a:p>
+        </p:txBody>
+      </p:sp>
+    </p:spTree>
+    <p:extLst>
+      <p:ext uri="{BB962C8B-B14F-4D97-AF65-F5344CB8AC3E}">
+        <p14:creationId xmlns:p14="http://schemas.microsoft.com/office/powerpoint/2010/main" val="2640755648"/>
+      </p:ext>
+    </p:extLst>
+  </p:cSld>
+  <p:clrMapOvr>
+    <a:masterClrMapping/>
+  </p:clrMapOvr>
+</p:notes>
+</file>
+
+<file path=ppt/notesSlides/notesSlide11.xml><?xml version="1.0" encoding="utf-8"?>
+<p:notes xmlns:a="http://schemas.openxmlformats.org/drawingml/2006/main" xmlns:r="http://schemas.openxmlformats.org/officeDocument/2006/relationships" xmlns:p="http://schemas.openxmlformats.org/presentationml/2006/main">
+  <p:cSld>
+    <p:spTree>
+      <p:nvGrpSpPr>
+        <p:cNvPr id="1" name=""/>
+        <p:cNvGrpSpPr/>
+        <p:nvPr/>
+      </p:nvGrpSpPr>
+      <p:grpSpPr>
+        <a:xfrm>
+          <a:off x="0" y="0"/>
+          <a:ext cx="0" cy="0"/>
+          <a:chOff x="0" y="0"/>
+          <a:chExt cx="0" cy="0"/>
+        </a:xfrm>
+      </p:grpSpPr>
+      <p:sp>
+        <p:nvSpPr>
+          <p:cNvPr id="2" name="投影片影像版面配置區 1"/>
+          <p:cNvSpPr>
+            <a:spLocks noGrp="1" noRot="1" noChangeAspect="1"/>
+          </p:cNvSpPr>
+          <p:nvPr>
+            <p:ph type="sldImg"/>
+          </p:nvPr>
+        </p:nvSpPr>
+        <p:spPr/>
+      </p:sp>
+      <p:sp>
+        <p:nvSpPr>
+          <p:cNvPr id="3" name="備忘稿版面配置區 2"/>
+          <p:cNvSpPr>
+            <a:spLocks noGrp="1"/>
+          </p:cNvSpPr>
+          <p:nvPr>
+            <p:ph type="body" idx="1"/>
+          </p:nvPr>
+        </p:nvSpPr>
+        <p:spPr/>
+        <p:txBody>
+          <a:bodyPr/>
+          <a:lstStyle/>
+          <a:p>
+            <a:pPr marL="171450" indent="-171450">
+              <a:buFont typeface="Arial" panose="020B0604020202020204" pitchFamily="34" charset="0"/>
+              <a:buChar char="•"/>
+            </a:pPr>
+            <a:endParaRPr lang="en-US" baseline="0" dirty="0">
+              <a:latin typeface="Times New Roman" panose="02020603050405020304" pitchFamily="18" charset="0"/>
+              <a:ea typeface="標楷體" panose="03000509000000000000" pitchFamily="65" charset="-120"/>
+              <a:cs typeface="Times New Roman" panose="02020603050405020304" pitchFamily="18" charset="0"/>
+            </a:endParaRPr>
+          </a:p>
+        </p:txBody>
+      </p:sp>
+      <p:sp>
+        <p:nvSpPr>
+          <p:cNvPr id="4" name="投影片編號版面配置區 3"/>
+          <p:cNvSpPr>
+            <a:spLocks noGrp="1"/>
+          </p:cNvSpPr>
+          <p:nvPr>
+            <p:ph type="sldNum" sz="quarter" idx="5"/>
+          </p:nvPr>
+        </p:nvSpPr>
+        <p:spPr/>
+        <p:txBody>
+          <a:bodyPr/>
+          <a:lstStyle/>
+          <a:p>
+            <a:fld id="{CA802C15-8439-4650-9275-89E8E467F89F}" type="slidenum">
+              <a:rPr lang="zh-TW" altLang="en-US" smtClean="0"/>
+              <a:t>13</a:t>
+            </a:fld>
+            <a:endParaRPr lang="zh-TW" altLang="en-US"/>
+          </a:p>
+        </p:txBody>
+      </p:sp>
+    </p:spTree>
+    <p:extLst>
+      <p:ext uri="{BB962C8B-B14F-4D97-AF65-F5344CB8AC3E}">
+        <p14:creationId xmlns:p14="http://schemas.microsoft.com/office/powerpoint/2010/main" val="283829248"/>
+      </p:ext>
+    </p:extLst>
+  </p:cSld>
+  <p:clrMapOvr>
+    <a:masterClrMapping/>
+  </p:clrMapOvr>
+</p:notes>
+</file>
+
+<file path=ppt/notesSlides/notesSlide12.xml><?xml version="1.0" encoding="utf-8"?>
+<p:notes xmlns:a="http://schemas.openxmlformats.org/drawingml/2006/main" xmlns:r="http://schemas.openxmlformats.org/officeDocument/2006/relationships" xmlns:p="http://schemas.openxmlformats.org/presentationml/2006/main">
+  <p:cSld>
+    <p:spTree>
+      <p:nvGrpSpPr>
+        <p:cNvPr id="1" name=""/>
+        <p:cNvGrpSpPr/>
+        <p:nvPr/>
+      </p:nvGrpSpPr>
+      <p:grpSpPr>
+        <a:xfrm>
+          <a:off x="0" y="0"/>
+          <a:ext cx="0" cy="0"/>
+          <a:chOff x="0" y="0"/>
+          <a:chExt cx="0" cy="0"/>
+        </a:xfrm>
+      </p:grpSpPr>
+      <p:sp>
+        <p:nvSpPr>
+          <p:cNvPr id="2" name="投影片影像版面配置區 1"/>
+          <p:cNvSpPr>
+            <a:spLocks noGrp="1" noRot="1" noChangeAspect="1"/>
+          </p:cNvSpPr>
+          <p:nvPr>
+            <p:ph type="sldImg"/>
+          </p:nvPr>
+        </p:nvSpPr>
+        <p:spPr/>
+      </p:sp>
+      <p:sp>
+        <p:nvSpPr>
+          <p:cNvPr id="3" name="備忘稿版面配置區 2"/>
+          <p:cNvSpPr>
+            <a:spLocks noGrp="1"/>
+          </p:cNvSpPr>
+          <p:nvPr>
+            <p:ph type="body" idx="1"/>
+          </p:nvPr>
+        </p:nvSpPr>
+        <p:spPr/>
+        <p:txBody>
+          <a:bodyPr/>
+          <a:lstStyle/>
+          <a:p>
+            <a:pPr marL="171450" indent="-171450">
+              <a:buFont typeface="Arial" panose="020B0604020202020204" pitchFamily="34" charset="0"/>
+              <a:buChar char="•"/>
+            </a:pPr>
+            <a:endParaRPr lang="en-US" dirty="0">
+              <a:latin typeface="Times New Roman" panose="02020603050405020304" pitchFamily="18" charset="0"/>
+              <a:cs typeface="Times New Roman" panose="02020603050405020304" pitchFamily="18" charset="0"/>
+            </a:endParaRPr>
+          </a:p>
+        </p:txBody>
+      </p:sp>
+      <p:sp>
+        <p:nvSpPr>
+          <p:cNvPr id="4" name="投影片編號版面配置區 3"/>
+          <p:cNvSpPr>
+            <a:spLocks noGrp="1"/>
+          </p:cNvSpPr>
+          <p:nvPr>
+            <p:ph type="sldNum" sz="quarter" idx="5"/>
+          </p:nvPr>
+        </p:nvSpPr>
+        <p:spPr/>
+        <p:txBody>
+          <a:bodyPr/>
+          <a:lstStyle/>
+          <a:p>
+            <a:fld id="{CA802C15-8439-4650-9275-89E8E467F89F}" type="slidenum">
+              <a:rPr lang="zh-TW" altLang="en-US" smtClean="0"/>
+              <a:t>14</a:t>
+            </a:fld>
+            <a:endParaRPr lang="zh-TW" altLang="en-US"/>
+          </a:p>
+        </p:txBody>
+      </p:sp>
+    </p:spTree>
+    <p:extLst>
+      <p:ext uri="{BB962C8B-B14F-4D97-AF65-F5344CB8AC3E}">
+        <p14:creationId xmlns:p14="http://schemas.microsoft.com/office/powerpoint/2010/main" val="4093892230"/>
+      </p:ext>
+    </p:extLst>
+  </p:cSld>
+  <p:clrMapOvr>
+    <a:masterClrMapping/>
+  </p:clrMapOvr>
+</p:notes>
+</file>
+
 <file path=ppt/notesSlides/notesSlide2.xml><?xml version="1.0" encoding="utf-8"?>
 <p:notes xmlns:a="http://schemas.openxmlformats.org/drawingml/2006/main" xmlns:r="http://schemas.openxmlformats.org/officeDocument/2006/relationships" xmlns:p="http://schemas.openxmlformats.org/presentationml/2006/main">
   <p:cSld>
@@ -5357,6 +5636,186 @@
           <a:bodyPr/>
           <a:lstStyle/>
           <a:p>
+            <a:pPr marL="171450" indent="-171450">
+              <a:buFont typeface="Arial" panose="020B0604020202020204" pitchFamily="34" charset="0"/>
+              <a:buChar char="•"/>
+            </a:pPr>
+            <a:r>
+              <a:rPr lang="en-US" altLang="zh-TW" sz="1200" kern="1200" dirty="0">
+                <a:solidFill>
+                  <a:schemeClr val="tx1"/>
+                </a:solidFill>
+                <a:latin typeface="+mn-lt"/>
+                <a:ea typeface="+mn-ea"/>
+                <a:cs typeface="+mn-cs"/>
+              </a:rPr>
+              <a:t>BTMD </a:t>
+            </a:r>
+            <a:r>
+              <a:rPr lang="zh-TW" altLang="en-US" sz="1200" kern="1200" dirty="0">
+                <a:solidFill>
+                  <a:schemeClr val="tx1"/>
+                </a:solidFill>
+                <a:latin typeface="+mn-lt"/>
+                <a:ea typeface="+mn-ea"/>
+                <a:cs typeface="+mn-cs"/>
+              </a:rPr>
+              <a:t>基於使用 </a:t>
+            </a:r>
+            <a:r>
+              <a:rPr lang="en-US" altLang="zh-TW" sz="1200" kern="1200" dirty="0">
+                <a:solidFill>
+                  <a:schemeClr val="tx1"/>
+                </a:solidFill>
+                <a:latin typeface="+mn-lt"/>
+                <a:ea typeface="+mn-ea"/>
+                <a:cs typeface="+mn-cs"/>
+              </a:rPr>
+              <a:t>Infinium HumanMethylation450 </a:t>
+            </a:r>
+            <a:r>
+              <a:rPr lang="en-US" altLang="zh-TW" sz="1200" kern="1200" dirty="0" err="1">
+                <a:solidFill>
+                  <a:schemeClr val="tx1"/>
+                </a:solidFill>
+                <a:latin typeface="+mn-lt"/>
+                <a:ea typeface="+mn-ea"/>
+                <a:cs typeface="+mn-cs"/>
+              </a:rPr>
+              <a:t>BeadChip</a:t>
+            </a:r>
+            <a:r>
+              <a:rPr lang="en-US" altLang="zh-TW" sz="1200" kern="1200" dirty="0">
+                <a:solidFill>
+                  <a:schemeClr val="tx1"/>
+                </a:solidFill>
+                <a:latin typeface="+mn-lt"/>
+                <a:ea typeface="+mn-ea"/>
+                <a:cs typeface="+mn-cs"/>
+              </a:rPr>
+              <a:t> </a:t>
+            </a:r>
+            <a:r>
+              <a:rPr lang="zh-TW" altLang="en-US" sz="1200" kern="1200" dirty="0">
+                <a:solidFill>
+                  <a:schemeClr val="tx1"/>
+                </a:solidFill>
+                <a:latin typeface="+mn-lt"/>
+                <a:ea typeface="+mn-ea"/>
+                <a:cs typeface="+mn-cs"/>
+              </a:rPr>
+              <a:t>技術（</a:t>
+            </a:r>
+            <a:r>
+              <a:rPr lang="en-US" altLang="zh-TW" sz="1200" kern="1200" dirty="0">
+                <a:solidFill>
+                  <a:schemeClr val="tx1"/>
+                </a:solidFill>
+                <a:latin typeface="+mn-lt"/>
+                <a:ea typeface="+mn-ea"/>
+                <a:cs typeface="+mn-cs"/>
+              </a:rPr>
+              <a:t>450k</a:t>
+            </a:r>
+            <a:r>
+              <a:rPr lang="zh-TW" altLang="en-US" sz="1200" kern="1200" dirty="0">
+                <a:solidFill>
+                  <a:schemeClr val="tx1"/>
+                </a:solidFill>
+                <a:latin typeface="+mn-lt"/>
+                <a:ea typeface="+mn-ea"/>
+                <a:cs typeface="+mn-cs"/>
+              </a:rPr>
+              <a:t>；</a:t>
+            </a:r>
+            <a:r>
+              <a:rPr lang="en-US" altLang="zh-TW" sz="1200" kern="1200" dirty="0">
+                <a:solidFill>
+                  <a:schemeClr val="tx1"/>
+                </a:solidFill>
+                <a:latin typeface="+mn-lt"/>
+                <a:ea typeface="+mn-ea"/>
+                <a:cs typeface="+mn-cs"/>
+              </a:rPr>
+              <a:t>Illumina</a:t>
+            </a:r>
+            <a:r>
+              <a:rPr lang="zh-TW" altLang="en-US" sz="1200" kern="1200" dirty="0">
+                <a:solidFill>
+                  <a:schemeClr val="tx1"/>
+                </a:solidFill>
+                <a:latin typeface="+mn-lt"/>
+                <a:ea typeface="+mn-ea"/>
+                <a:cs typeface="+mn-cs"/>
+              </a:rPr>
+              <a:t>）對 </a:t>
+            </a:r>
+            <a:r>
+              <a:rPr lang="en-US" altLang="zh-TW" sz="1200" kern="1200" dirty="0">
+                <a:solidFill>
+                  <a:schemeClr val="tx1"/>
+                </a:solidFill>
+                <a:latin typeface="+mn-lt"/>
+                <a:ea typeface="+mn-ea"/>
+                <a:cs typeface="+mn-cs"/>
+              </a:rPr>
+              <a:t>485,577 </a:t>
+            </a:r>
+            <a:r>
+              <a:rPr lang="zh-TW" altLang="en-US" sz="1200" kern="1200" dirty="0">
+                <a:solidFill>
+                  <a:schemeClr val="tx1"/>
+                </a:solidFill>
+                <a:latin typeface="+mn-lt"/>
+                <a:ea typeface="+mn-ea"/>
+                <a:cs typeface="+mn-cs"/>
+              </a:rPr>
+              <a:t>個 </a:t>
+            </a:r>
+            <a:r>
+              <a:rPr lang="en-US" altLang="zh-TW" sz="1200" kern="1200" dirty="0">
+                <a:solidFill>
+                  <a:schemeClr val="tx1"/>
+                </a:solidFill>
+                <a:latin typeface="+mn-lt"/>
+                <a:ea typeface="+mn-ea"/>
+                <a:cs typeface="+mn-cs"/>
+              </a:rPr>
+              <a:t>CpG </a:t>
+            </a:r>
+            <a:r>
+              <a:rPr lang="zh-TW" altLang="en-US" sz="1200" kern="1200" dirty="0">
+                <a:solidFill>
+                  <a:schemeClr val="tx1"/>
+                </a:solidFill>
+                <a:latin typeface="+mn-lt"/>
+                <a:ea typeface="+mn-ea"/>
+                <a:cs typeface="+mn-cs"/>
+              </a:rPr>
+              <a:t>位點的 </a:t>
+            </a:r>
+            <a:r>
+              <a:rPr lang="en-US" altLang="zh-TW" sz="1200" kern="1200" dirty="0">
+                <a:solidFill>
+                  <a:schemeClr val="tx1"/>
+                </a:solidFill>
+                <a:latin typeface="+mn-lt"/>
+                <a:ea typeface="+mn-ea"/>
+                <a:cs typeface="+mn-cs"/>
+              </a:rPr>
+              <a:t>DNA </a:t>
+            </a:r>
+            <a:r>
+              <a:rPr lang="zh-TW" altLang="en-US" sz="1200" kern="1200" dirty="0">
+                <a:solidFill>
+                  <a:schemeClr val="tx1"/>
+                </a:solidFill>
+                <a:latin typeface="+mn-lt"/>
+                <a:ea typeface="+mn-ea"/>
+                <a:cs typeface="+mn-cs"/>
+              </a:rPr>
+              <a:t>甲基化進行的全基因組定量測量</a:t>
+            </a:r>
             <a:endParaRPr lang="en-US" dirty="0"/>
           </a:p>
         </p:txBody>
@@ -5378,7 +5837,7 @@
           <a:p>
             <a:fld id="{CA802C15-8439-4650-9275-89E8E467F89F}" type="slidenum">
               <a:rPr lang="zh-TW" altLang="en-US" smtClean="0"/>
-              <a:t>10</a:t>
+              <a:t>9</a:t>
             </a:fld>
             <a:endParaRPr lang="zh-TW" altLang="en-US"/>
           </a:p>
@@ -5387,7 +5846,7 @@
     </p:spTree>
     <p:extLst>
       <p:ext uri="{BB962C8B-B14F-4D97-AF65-F5344CB8AC3E}">
-        <p14:creationId xmlns:p14="http://schemas.microsoft.com/office/powerpoint/2010/main" val="66195304"/>
+        <p14:creationId xmlns:p14="http://schemas.microsoft.com/office/powerpoint/2010/main" val="2649644714"/>
       </p:ext>
     </p:extLst>
   </p:cSld>
@@ -5441,15 +5900,7 @@
           <a:bodyPr/>
           <a:lstStyle/>
           <a:p>
-            <a:pPr marL="171450" indent="-171450">
-              <a:buFont typeface="Arial" panose="020B0604020202020204" pitchFamily="34" charset="0"/>
-              <a:buChar char="•"/>
-            </a:pPr>
-            <a:endParaRPr lang="en-US" baseline="0" dirty="0">
-              <a:latin typeface="Times New Roman" panose="02020603050405020304" pitchFamily="18" charset="0"/>
-              <a:ea typeface="標楷體" panose="03000509000000000000" pitchFamily="65" charset="-120"/>
-              <a:cs typeface="Times New Roman" panose="02020603050405020304" pitchFamily="18" charset="0"/>
-            </a:endParaRPr>
+            <a:endParaRPr lang="en-US" dirty="0"/>
           </a:p>
         </p:txBody>
       </p:sp>
@@ -5470,7 +5921,7 @@
           <a:p>
             <a:fld id="{CA802C15-8439-4650-9275-89E8E467F89F}" type="slidenum">
               <a:rPr lang="zh-TW" altLang="en-US" smtClean="0"/>
-              <a:t>11</a:t>
+              <a:t>10</a:t>
             </a:fld>
             <a:endParaRPr lang="zh-TW" altLang="en-US"/>
           </a:p>
@@ -5479,7 +5930,7 @@
     </p:spTree>
     <p:extLst>
       <p:ext uri="{BB962C8B-B14F-4D97-AF65-F5344CB8AC3E}">
-        <p14:creationId xmlns:p14="http://schemas.microsoft.com/office/powerpoint/2010/main" val="2640755648"/>
+        <p14:creationId xmlns:p14="http://schemas.microsoft.com/office/powerpoint/2010/main" val="66195304"/>
       </p:ext>
     </p:extLst>
   </p:cSld>
@@ -5537,8 +5988,180 @@
               <a:buFont typeface="Arial" panose="020B0604020202020204" pitchFamily="34" charset="0"/>
               <a:buChar char="•"/>
             </a:pPr>
-            <a:endParaRPr lang="en-US" dirty="0">
+            <a:r>
+              <a:rPr lang="zh-TW" altLang="en-US" baseline="0" dirty="0">
+                <a:latin typeface="Times New Roman" panose="02020603050405020304" pitchFamily="18" charset="0"/>
+                <a:ea typeface="標楷體" panose="03000509000000000000" pitchFamily="65" charset="-120"/>
+                <a:cs typeface="Times New Roman" panose="02020603050405020304" pitchFamily="18" charset="0"/>
+              </a:rPr>
+              <a:t>在紅色圓圈代表是個</a:t>
+            </a:r>
+            <a:r>
+              <a:rPr lang="en-US" altLang="zh-TW" baseline="0" dirty="0">
+                <a:latin typeface="Times New Roman" panose="02020603050405020304" pitchFamily="18" charset="0"/>
+                <a:ea typeface="標楷體" panose="03000509000000000000" pitchFamily="65" charset="-120"/>
+                <a:cs typeface="Times New Roman" panose="02020603050405020304" pitchFamily="18" charset="0"/>
+              </a:rPr>
+              <a:t>entry point</a:t>
+            </a:r>
+            <a:r>
+              <a:rPr lang="zh-TW" altLang="en-US" baseline="0" dirty="0">
+                <a:latin typeface="Times New Roman" panose="02020603050405020304" pitchFamily="18" charset="0"/>
+                <a:ea typeface="標楷體" panose="03000509000000000000" pitchFamily="65" charset="-120"/>
+                <a:cs typeface="Times New Roman" panose="02020603050405020304" pitchFamily="18" charset="0"/>
+              </a:rPr>
+              <a:t>，可以任意更改內部的方法</a:t>
+            </a:r>
+            <a:r>
+              <a:rPr lang="en-US" altLang="zh-TW" baseline="0" dirty="0">
+                <a:latin typeface="Times New Roman" panose="02020603050405020304" pitchFamily="18" charset="0"/>
+                <a:ea typeface="標楷體" panose="03000509000000000000" pitchFamily="65" charset="-120"/>
+                <a:cs typeface="Times New Roman" panose="02020603050405020304" pitchFamily="18" charset="0"/>
+              </a:rPr>
+              <a:t>(</a:t>
+            </a:r>
+            <a:r>
+              <a:rPr lang="zh-TW" altLang="en-US" baseline="0" dirty="0">
+                <a:latin typeface="Times New Roman" panose="02020603050405020304" pitchFamily="18" charset="0"/>
+                <a:ea typeface="標楷體" panose="03000509000000000000" pitchFamily="65" charset="-120"/>
+                <a:cs typeface="Times New Roman" panose="02020603050405020304" pitchFamily="18" charset="0"/>
+              </a:rPr>
+              <a:t>推薦從</a:t>
+            </a:r>
+            <a:r>
+              <a:rPr lang="en-US" altLang="zh-TW" baseline="0" dirty="0">
+                <a:latin typeface="Times New Roman" panose="02020603050405020304" pitchFamily="18" charset="0"/>
+                <a:ea typeface="標楷體" panose="03000509000000000000" pitchFamily="65" charset="-120"/>
+                <a:cs typeface="Times New Roman" panose="02020603050405020304" pitchFamily="18" charset="0"/>
+              </a:rPr>
+              <a:t>step6</a:t>
+            </a:r>
+            <a:r>
+              <a:rPr lang="zh-TW" altLang="en-US" baseline="0" dirty="0">
+                <a:latin typeface="Times New Roman" panose="02020603050405020304" pitchFamily="18" charset="0"/>
+                <a:ea typeface="標楷體" panose="03000509000000000000" pitchFamily="65" charset="-120"/>
+                <a:cs typeface="Times New Roman" panose="02020603050405020304" pitchFamily="18" charset="0"/>
+              </a:rPr>
+              <a:t>的地方切入</a:t>
+            </a:r>
+            <a:r>
+              <a:rPr lang="en-US" altLang="zh-TW" baseline="0" dirty="0">
+                <a:latin typeface="Times New Roman" panose="02020603050405020304" pitchFamily="18" charset="0"/>
+                <a:ea typeface="標楷體" panose="03000509000000000000" pitchFamily="65" charset="-120"/>
+                <a:cs typeface="Times New Roman" panose="02020603050405020304" pitchFamily="18" charset="0"/>
+              </a:rPr>
+              <a:t>)</a:t>
+            </a:r>
+          </a:p>
+          <a:p>
+            <a:pPr marL="171450" indent="-171450">
+              <a:buFont typeface="Arial" panose="020B0604020202020204" pitchFamily="34" charset="0"/>
+              <a:buChar char="•"/>
+            </a:pPr>
+            <a:r>
+              <a:rPr lang="zh-TW" altLang="en-US" dirty="0"/>
+              <a:t>紫框矩形表示數據對象，如 </a:t>
+            </a:r>
+            <a:r>
+              <a:rPr lang="en-US" altLang="zh-TW" dirty="0"/>
+              <a:t>Illumina </a:t>
+            </a:r>
+            <a:r>
+              <a:rPr lang="zh-TW" altLang="en-US" dirty="0"/>
+              <a:t>甲基化</a:t>
+            </a:r>
+            <a:r>
+              <a:rPr lang="en-US" altLang="zh-TW" dirty="0"/>
+              <a:t>micro array</a:t>
+            </a:r>
+            <a:r>
+              <a:rPr lang="zh-TW" altLang="en-US" dirty="0"/>
+              <a:t>輸出，用於 </a:t>
+            </a:r>
+            <a:r>
+              <a:rPr lang="en-US" altLang="zh-TW" dirty="0"/>
+              <a:t>5 × 5 nested</a:t>
+            </a:r>
+            <a:r>
+              <a:rPr lang="zh-TW" altLang="en-US" dirty="0"/>
+              <a:t> </a:t>
+            </a:r>
+            <a:r>
+              <a:rPr lang="en-US" altLang="zh-TW" dirty="0"/>
+              <a:t>CV </a:t>
+            </a:r>
+            <a:r>
+              <a:rPr lang="zh-TW" altLang="en-US" dirty="0"/>
+              <a:t>方案，由機器學習算法進行擬合</a:t>
+            </a:r>
+            <a:endParaRPr lang="en-US" altLang="zh-TW" dirty="0"/>
+          </a:p>
+          <a:p>
+            <a:pPr marL="171450" indent="-171450">
+              <a:buFont typeface="Arial" panose="020B0604020202020204" pitchFamily="34" charset="0"/>
+              <a:buChar char="•"/>
+            </a:pPr>
+            <a:r>
+              <a:rPr lang="zh-TW" altLang="en-US" dirty="0"/>
+              <a:t>淺藍色框的矩形表示過程：數據預處理方法，例如歸一化或批效應調整，或性能評估指標</a:t>
+            </a:r>
+            <a:endParaRPr lang="en-US" altLang="zh-TW" dirty="0"/>
+          </a:p>
+          <a:p>
+            <a:pPr marL="171450" indent="-171450">
+              <a:buFont typeface="Arial" panose="020B0604020202020204" pitchFamily="34" charset="0"/>
+              <a:buChar char="•"/>
+            </a:pPr>
+            <a:r>
+              <a:rPr lang="zh-TW" altLang="en-US" dirty="0"/>
+              <a:t>外部 </a:t>
+            </a:r>
+            <a:r>
+              <a:rPr lang="en-US" altLang="zh-TW" dirty="0"/>
+              <a:t>CV </a:t>
+            </a:r>
+            <a:r>
+              <a:rPr lang="zh-TW" altLang="en-US" dirty="0"/>
+              <a:t>循環中的深藍色和紅色框分別代表外部折疊 </a:t>
+            </a:r>
+            <a:r>
+              <a:rPr lang="en-US" altLang="zh-TW" dirty="0"/>
+              <a:t>(1.0; 2.0; …; 5.0) </a:t>
+            </a:r>
+            <a:r>
+              <a:rPr lang="zh-TW" altLang="en-US" dirty="0"/>
+              <a:t>訓練和測試集</a:t>
+            </a:r>
+            <a:endParaRPr lang="en-US" altLang="zh-TW" dirty="0"/>
+          </a:p>
+          <a:p>
+            <a:pPr marL="171450" indent="-171450">
+              <a:buFont typeface="Arial" panose="020B0604020202020204" pitchFamily="34" charset="0"/>
+              <a:buChar char="•"/>
+            </a:pPr>
+            <a:r>
+              <a:rPr lang="zh-TW" altLang="en-US" dirty="0"/>
+              <a:t>同樣，在內部 </a:t>
+            </a:r>
+            <a:r>
+              <a:rPr lang="en-US" altLang="zh-TW" dirty="0"/>
+              <a:t>CV </a:t>
+            </a:r>
+            <a:r>
+              <a:rPr lang="zh-TW" altLang="en-US" dirty="0"/>
+              <a:t>循環 </a:t>
+            </a:r>
+            <a:r>
+              <a:rPr lang="en-US" altLang="zh-TW" dirty="0"/>
+              <a:t>(1.1; 1.2; …; 1.5) </a:t>
+            </a:r>
+            <a:r>
+              <a:rPr lang="zh-TW" altLang="en-US" dirty="0"/>
+              <a:t>中，藍色和紅色矩形分別表示嵌套的訓練和校準集</a:t>
+            </a:r>
+            <a:endParaRPr lang="en-US" baseline="0" dirty="0">
               <a:latin typeface="Times New Roman" panose="02020603050405020304" pitchFamily="18" charset="0"/>
+              <a:ea typeface="標楷體" panose="03000509000000000000" pitchFamily="65" charset="-120"/>
               <a:cs typeface="Times New Roman" panose="02020603050405020304" pitchFamily="18" charset="0"/>
             </a:endParaRPr>
           </a:p>
@@ -5561,7 +6184,7 @@
           <a:p>
             <a:fld id="{CA802C15-8439-4650-9275-89E8E467F89F}" type="slidenum">
               <a:rPr lang="zh-TW" altLang="en-US" smtClean="0"/>
-              <a:t>12</a:t>
+              <a:t>11</a:t>
             </a:fld>
             <a:endParaRPr lang="zh-TW" altLang="en-US"/>
           </a:p>
@@ -5570,7 +6193,7 @@
     </p:spTree>
     <p:extLst>
       <p:ext uri="{BB962C8B-B14F-4D97-AF65-F5344CB8AC3E}">
-        <p14:creationId xmlns:p14="http://schemas.microsoft.com/office/powerpoint/2010/main" val="4093892230"/>
+        <p14:creationId xmlns:p14="http://schemas.microsoft.com/office/powerpoint/2010/main" val="4078421181"/>
       </p:ext>
     </p:extLst>
   </p:cSld>
@@ -10061,6 +10684,42 @@
           <a:chExt cx="0" cy="0"/>
         </a:xfrm>
       </p:grpSpPr>
+      <p:pic>
+        <p:nvPicPr>
+          <p:cNvPr id="8" name="圖片 7">
+            <a:extLst>
+              <a:ext uri="{FF2B5EF4-FFF2-40B4-BE49-F238E27FC236}">
+                <a16:creationId xmlns:a16="http://schemas.microsoft.com/office/drawing/2014/main" id="{64928AE0-C34B-4CEF-9319-18D133AC5C79}"/>
+              </a:ext>
+            </a:extLst>
+          </p:cNvPr>
+          <p:cNvPicPr>
+            <a:picLocks noChangeAspect="1"/>
+          </p:cNvPicPr>
+          <p:nvPr/>
+        </p:nvPicPr>
+        <p:blipFill>
+          <a:blip r:embed="rId3">
+            <a:extLst>
+              <a:ext uri="{28A0092B-C50C-407E-A947-70E740481C1C}">
+                <a14:useLocalDpi xmlns:a14="http://schemas.microsoft.com/office/drawing/2010/main" val="0"/>
+              </a:ext>
+            </a:extLst>
+          </a:blip>
+          <a:stretch>
+            <a:fillRect/>
+          </a:stretch>
+        </p:blipFill>
+        <p:spPr>
+          <a:xfrm>
+            <a:off x="137634" y="1676400"/>
+            <a:ext cx="6078699" cy="4554986"/>
+          </a:xfrm>
+          <a:prstGeom prst="rect">
+            <a:avLst/>
+          </a:prstGeom>
+        </p:spPr>
+      </p:pic>
       <p:sp>
         <p:nvSpPr>
           <p:cNvPr id="2" name="標題 1">
@@ -10088,41 +10747,21 @@
                 <a:ea typeface="標楷體" panose="03000509000000000000" pitchFamily="65" charset="-120"/>
                 <a:cs typeface="Times New Roman" panose="02020603050405020304" pitchFamily="18" charset="0"/>
               </a:rPr>
-              <a:t>Designed Experiment</a:t>
+              <a:t>Designed </a:t>
+            </a:r>
+            <a:r>
+              <a:rPr lang="en-US" altLang="zh-TW" dirty="0">
+                <a:cs typeface="Times New Roman" panose="02020603050405020304" pitchFamily="18" charset="0"/>
+              </a:rPr>
+              <a:t>Experiment – </a:t>
+            </a:r>
+            <a:r>
+              <a:rPr lang="en-US" altLang="zh-TW" sz="2400" dirty="0">
+                <a:cs typeface="Times New Roman" panose="02020603050405020304" pitchFamily="18" charset="0"/>
+              </a:rPr>
+              <a:t>Data preparation and pre-processing</a:t>
             </a:r>
             <a:endParaRPr lang="en-US" dirty="0"/>
-          </a:p>
-        </p:txBody>
-      </p:sp>
-      <p:sp>
-        <p:nvSpPr>
-          <p:cNvPr id="3" name="內容版面配置區 2">
-            <a:extLst>
-              <a:ext uri="{FF2B5EF4-FFF2-40B4-BE49-F238E27FC236}">
-                <a16:creationId xmlns:a16="http://schemas.microsoft.com/office/drawing/2014/main" id="{4729ADF7-84BC-42C9-A38C-D09E00D84A4C}"/>
-              </a:ext>
-            </a:extLst>
-          </p:cNvPr>
-          <p:cNvSpPr>
-            <a:spLocks noGrp="1"/>
-          </p:cNvSpPr>
-          <p:nvPr>
-            <p:ph idx="1"/>
-          </p:nvPr>
-        </p:nvSpPr>
-        <p:spPr>
-          <a:xfrm>
-            <a:off x="838200" y="1690689"/>
-            <a:ext cx="10302240" cy="4557712"/>
-          </a:xfrm>
-        </p:spPr>
-        <p:txBody>
-          <a:bodyPr>
-            <a:normAutofit/>
-          </a:bodyPr>
-          <a:lstStyle/>
-          <a:p>
-            <a:endParaRPr lang="en-US" sz="2000" dirty="0"/>
           </a:p>
         </p:txBody>
       </p:sp>
@@ -10156,10 +10795,97 @@
           </a:p>
         </p:txBody>
       </p:sp>
+      <p:grpSp>
+        <p:nvGrpSpPr>
+          <p:cNvPr id="9" name="群組 8">
+            <a:extLst>
+              <a:ext uri="{FF2B5EF4-FFF2-40B4-BE49-F238E27FC236}">
+                <a16:creationId xmlns:a16="http://schemas.microsoft.com/office/drawing/2014/main" id="{9A180DA8-3BF9-4C9C-AF51-417F91F4EF4A}"/>
+              </a:ext>
+            </a:extLst>
+          </p:cNvPr>
+          <p:cNvGrpSpPr/>
+          <p:nvPr/>
+        </p:nvGrpSpPr>
+        <p:grpSpPr>
+          <a:xfrm>
+            <a:off x="6216333" y="1554163"/>
+            <a:ext cx="5716113" cy="5167312"/>
+            <a:chOff x="6096000" y="1554163"/>
+            <a:chExt cx="5716113" cy="5167312"/>
+          </a:xfrm>
+        </p:grpSpPr>
+        <p:pic>
+          <p:nvPicPr>
+            <p:cNvPr id="10" name="圖片 9">
+              <a:extLst>
+                <a:ext uri="{FF2B5EF4-FFF2-40B4-BE49-F238E27FC236}">
+                  <a16:creationId xmlns:a16="http://schemas.microsoft.com/office/drawing/2014/main" id="{FB028CAA-3D49-4F5B-B7FC-0E1B473C9514}"/>
+                </a:ext>
+              </a:extLst>
+            </p:cNvPr>
+            <p:cNvPicPr>
+              <a:picLocks noChangeAspect="1"/>
+            </p:cNvPicPr>
+            <p:nvPr/>
+          </p:nvPicPr>
+          <p:blipFill>
+            <a:blip r:embed="rId4">
+              <a:extLst>
+                <a:ext uri="{28A0092B-C50C-407E-A947-70E740481C1C}">
+                  <a14:useLocalDpi xmlns:a14="http://schemas.microsoft.com/office/drawing/2010/main" val="0"/>
+                </a:ext>
+              </a:extLst>
+            </a:blip>
+            <a:stretch>
+              <a:fillRect/>
+            </a:stretch>
+          </p:blipFill>
+          <p:spPr>
+            <a:xfrm>
+              <a:off x="6096000" y="1554163"/>
+              <a:ext cx="5365593" cy="5167312"/>
+            </a:xfrm>
+            <a:prstGeom prst="rect">
+              <a:avLst/>
+            </a:prstGeom>
+          </p:spPr>
+        </p:pic>
+        <p:pic>
+          <p:nvPicPr>
+            <p:cNvPr id="11" name="圖片 10">
+              <a:extLst>
+                <a:ext uri="{FF2B5EF4-FFF2-40B4-BE49-F238E27FC236}">
+                  <a16:creationId xmlns:a16="http://schemas.microsoft.com/office/drawing/2014/main" id="{3F31B587-A3E1-4E61-AF85-572C9E6D9030}"/>
+                </a:ext>
+              </a:extLst>
+            </p:cNvPr>
+            <p:cNvPicPr>
+              <a:picLocks noChangeAspect="1"/>
+            </p:cNvPicPr>
+            <p:nvPr/>
+          </p:nvPicPr>
+          <p:blipFill>
+            <a:blip r:embed="rId5"/>
+            <a:stretch>
+              <a:fillRect/>
+            </a:stretch>
+          </p:blipFill>
+          <p:spPr>
+            <a:xfrm>
+              <a:off x="11446353" y="1751648"/>
+              <a:ext cx="365760" cy="400930"/>
+            </a:xfrm>
+            <a:prstGeom prst="rect">
+              <a:avLst/>
+            </a:prstGeom>
+          </p:spPr>
+        </p:pic>
+      </p:grpSp>
     </p:spTree>
     <p:extLst>
       <p:ext uri="{BB962C8B-B14F-4D97-AF65-F5344CB8AC3E}">
-        <p14:creationId xmlns:p14="http://schemas.microsoft.com/office/powerpoint/2010/main" val="860791272"/>
+        <p14:creationId xmlns:p14="http://schemas.microsoft.com/office/powerpoint/2010/main" val="2760946968"/>
       </p:ext>
     </p:extLst>
   </p:cSld>
@@ -10186,12 +10912,48 @@
           <a:chExt cx="0" cy="0"/>
         </a:xfrm>
       </p:grpSpPr>
+      <p:pic>
+        <p:nvPicPr>
+          <p:cNvPr id="8" name="圖片 7">
+            <a:extLst>
+              <a:ext uri="{FF2B5EF4-FFF2-40B4-BE49-F238E27FC236}">
+                <a16:creationId xmlns:a16="http://schemas.microsoft.com/office/drawing/2014/main" id="{64928AE0-C34B-4CEF-9319-18D133AC5C79}"/>
+              </a:ext>
+            </a:extLst>
+          </p:cNvPr>
+          <p:cNvPicPr>
+            <a:picLocks noChangeAspect="1"/>
+          </p:cNvPicPr>
+          <p:nvPr/>
+        </p:nvPicPr>
+        <p:blipFill>
+          <a:blip r:embed="rId3">
+            <a:extLst>
+              <a:ext uri="{28A0092B-C50C-407E-A947-70E740481C1C}">
+                <a14:useLocalDpi xmlns:a14="http://schemas.microsoft.com/office/drawing/2010/main" val="0"/>
+              </a:ext>
+            </a:extLst>
+          </a:blip>
+          <a:stretch>
+            <a:fillRect/>
+          </a:stretch>
+        </p:blipFill>
+        <p:spPr>
+          <a:xfrm>
+            <a:off x="5055627" y="1568074"/>
+            <a:ext cx="6877293" cy="5153401"/>
+          </a:xfrm>
+          <a:prstGeom prst="rect">
+            <a:avLst/>
+          </a:prstGeom>
+        </p:spPr>
+      </p:pic>
       <p:sp>
         <p:nvSpPr>
           <p:cNvPr id="2" name="標題 1">
             <a:extLst>
               <a:ext uri="{FF2B5EF4-FFF2-40B4-BE49-F238E27FC236}">
-                <a16:creationId xmlns:a16="http://schemas.microsoft.com/office/drawing/2014/main" id="{7DC51965-3B55-4A2C-8171-E572382DD444}"/>
+                <a16:creationId xmlns:a16="http://schemas.microsoft.com/office/drawing/2014/main" id="{D5BD2A02-094E-4049-86CE-1F0F31F00EC4}"/>
               </a:ext>
             </a:extLst>
           </p:cNvPr>
@@ -10213,22 +10975,65 @@
                 <a:ea typeface="標楷體" panose="03000509000000000000" pitchFamily="65" charset="-120"/>
                 <a:cs typeface="Times New Roman" panose="02020603050405020304" pitchFamily="18" charset="0"/>
               </a:rPr>
-              <a:t>Results and Comparisons</a:t>
-            </a:r>
-            <a:endParaRPr lang="zh-TW" altLang="en-US" dirty="0">
-              <a:latin typeface="Times New Roman" panose="02020603050405020304" pitchFamily="18" charset="0"/>
-              <a:ea typeface="標楷體" panose="03000509000000000000" pitchFamily="65" charset="-120"/>
-              <a:cs typeface="Times New Roman" panose="02020603050405020304" pitchFamily="18" charset="0"/>
-            </a:endParaRPr>
+              <a:t>Designed </a:t>
+            </a:r>
+            <a:r>
+              <a:rPr lang="en-US" altLang="zh-TW" dirty="0">
+                <a:cs typeface="Times New Roman" panose="02020603050405020304" pitchFamily="18" charset="0"/>
+              </a:rPr>
+              <a:t>Experiment – </a:t>
+            </a:r>
+            <a:r>
+              <a:rPr lang="en-US" altLang="zh-TW" sz="2400" dirty="0">
+                <a:cs typeface="Times New Roman" panose="02020603050405020304" pitchFamily="18" charset="0"/>
+              </a:rPr>
+              <a:t>Data preparation and pre-processing</a:t>
+            </a:r>
+            <a:endParaRPr lang="en-US" dirty="0"/>
           </a:p>
         </p:txBody>
       </p:sp>
       <p:sp>
         <p:nvSpPr>
-          <p:cNvPr id="5" name="投影片編號版面配置區 4">
+          <p:cNvPr id="3" name="內容版面配置區 2">
             <a:extLst>
               <a:ext uri="{FF2B5EF4-FFF2-40B4-BE49-F238E27FC236}">
-                <a16:creationId xmlns:a16="http://schemas.microsoft.com/office/drawing/2014/main" id="{6FDB81DD-25D0-4B7D-85DA-019476717276}"/>
+                <a16:creationId xmlns:a16="http://schemas.microsoft.com/office/drawing/2014/main" id="{4729ADF7-84BC-42C9-A38C-D09E00D84A4C}"/>
+              </a:ext>
+            </a:extLst>
+          </p:cNvPr>
+          <p:cNvSpPr>
+            <a:spLocks noGrp="1"/>
+          </p:cNvSpPr>
+          <p:nvPr>
+            <p:ph idx="1"/>
+          </p:nvPr>
+        </p:nvSpPr>
+        <p:spPr>
+          <a:xfrm>
+            <a:off x="838200" y="1690689"/>
+            <a:ext cx="4217427" cy="4557712"/>
+          </a:xfrm>
+        </p:spPr>
+        <p:txBody>
+          <a:bodyPr>
+            <a:normAutofit/>
+          </a:bodyPr>
+          <a:lstStyle/>
+          <a:p>
+            <a:r>
+              <a:rPr lang="en-US" sz="2000" dirty="0"/>
+              <a:t>1</a:t>
+            </a:r>
+          </a:p>
+        </p:txBody>
+      </p:sp>
+      <p:sp>
+        <p:nvSpPr>
+          <p:cNvPr id="4" name="投影片編號版面配置區 3">
+            <a:extLst>
+              <a:ext uri="{FF2B5EF4-FFF2-40B4-BE49-F238E27FC236}">
+                <a16:creationId xmlns:a16="http://schemas.microsoft.com/office/drawing/2014/main" id="{0215B297-14CB-4790-8574-A3F756E6B81C}"/>
               </a:ext>
             </a:extLst>
           </p:cNvPr>
@@ -10245,25 +11050,18 @@
           <a:lstStyle/>
           <a:p>
             <a:fld id="{D2B5BE26-702C-4921-81E7-8AF275EDA2CC}" type="slidenum">
-              <a:rPr lang="zh-TW" altLang="en-US" smtClean="0">
-                <a:latin typeface="Times New Roman" panose="02020603050405020304" pitchFamily="18" charset="0"/>
-                <a:ea typeface="標楷體" panose="03000509000000000000" pitchFamily="65" charset="-120"/>
-                <a:cs typeface="Times New Roman" panose="02020603050405020304" pitchFamily="18" charset="0"/>
-              </a:rPr>
+              <a:rPr lang="zh-TW" altLang="en-US" smtClean="0"/>
+              <a:pPr/>
               <a:t>12</a:t>
             </a:fld>
-            <a:endParaRPr lang="zh-TW" altLang="en-US">
-              <a:latin typeface="Times New Roman" panose="02020603050405020304" pitchFamily="18" charset="0"/>
-              <a:ea typeface="標楷體" panose="03000509000000000000" pitchFamily="65" charset="-120"/>
-              <a:cs typeface="Times New Roman" panose="02020603050405020304" pitchFamily="18" charset="0"/>
-            </a:endParaRPr>
+            <a:endParaRPr lang="zh-TW" altLang="en-US"/>
           </a:p>
         </p:txBody>
       </p:sp>
     </p:spTree>
     <p:extLst>
       <p:ext uri="{BB962C8B-B14F-4D97-AF65-F5344CB8AC3E}">
-        <p14:creationId xmlns:p14="http://schemas.microsoft.com/office/powerpoint/2010/main" val="2326381744"/>
+        <p14:creationId xmlns:p14="http://schemas.microsoft.com/office/powerpoint/2010/main" val="860791272"/>
       </p:ext>
     </p:extLst>
   </p:cSld>
@@ -10295,7 +11093,7 @@
           <p:cNvPr id="2" name="標題 1">
             <a:extLst>
               <a:ext uri="{FF2B5EF4-FFF2-40B4-BE49-F238E27FC236}">
-                <a16:creationId xmlns:a16="http://schemas.microsoft.com/office/drawing/2014/main" id="{7DC51965-3B55-4A2C-8171-E572382DD444}"/>
+                <a16:creationId xmlns:a16="http://schemas.microsoft.com/office/drawing/2014/main" id="{D5BD2A02-094E-4049-86CE-1F0F31F00EC4}"/>
               </a:ext>
             </a:extLst>
           </p:cNvPr>
@@ -10308,7 +11106,9 @@
         </p:nvSpPr>
         <p:spPr/>
         <p:txBody>
-          <a:bodyPr/>
+          <a:bodyPr>
+            <a:normAutofit/>
+          </a:bodyPr>
           <a:lstStyle/>
           <a:p>
             <a:r>
@@ -10317,13 +11117,21 @@
                 <a:ea typeface="標楷體" panose="03000509000000000000" pitchFamily="65" charset="-120"/>
                 <a:cs typeface="Times New Roman" panose="02020603050405020304" pitchFamily="18" charset="0"/>
               </a:rPr>
-              <a:t>Analysis and Discussion</a:t>
-            </a:r>
-            <a:endParaRPr lang="zh-TW" altLang="en-US" dirty="0">
-              <a:latin typeface="Times New Roman" panose="02020603050405020304" pitchFamily="18" charset="0"/>
-              <a:ea typeface="標楷體" panose="03000509000000000000" pitchFamily="65" charset="-120"/>
-              <a:cs typeface="Times New Roman" panose="02020603050405020304" pitchFamily="18" charset="0"/>
-            </a:endParaRPr>
+              <a:t>Designed </a:t>
+            </a:r>
+            <a:r>
+              <a:rPr lang="en-US" altLang="zh-TW" dirty="0">
+                <a:cs typeface="Times New Roman" panose="02020603050405020304" pitchFamily="18" charset="0"/>
+              </a:rPr>
+              <a:t>Experiment – </a:t>
+            </a:r>
+            <a:r>
+              <a:rPr lang="en-US" altLang="zh-TW" sz="3200" dirty="0">
+                <a:cs typeface="Times New Roman" panose="02020603050405020304" pitchFamily="18" charset="0"/>
+              </a:rPr>
+              <a:t>Nested CV &amp; Calibration</a:t>
+            </a:r>
+            <a:endParaRPr lang="en-US" dirty="0"/>
           </a:p>
         </p:txBody>
       </p:sp>
@@ -10332,7 +11140,7 @@
           <p:cNvPr id="3" name="內容版面配置區 2">
             <a:extLst>
               <a:ext uri="{FF2B5EF4-FFF2-40B4-BE49-F238E27FC236}">
-                <a16:creationId xmlns:a16="http://schemas.microsoft.com/office/drawing/2014/main" id="{7E658B3D-20B6-435E-B15B-C0553C4AE19F}"/>
+                <a16:creationId xmlns:a16="http://schemas.microsoft.com/office/drawing/2014/main" id="{4729ADF7-84BC-42C9-A38C-D09E00D84A4C}"/>
               </a:ext>
             </a:extLst>
           </p:cNvPr>
@@ -10345,8 +11153,8 @@
         </p:nvSpPr>
         <p:spPr>
           <a:xfrm>
-            <a:off x="838200" y="1690688"/>
-            <a:ext cx="10515600" cy="4486275"/>
+            <a:off x="838200" y="1690689"/>
+            <a:ext cx="5257800" cy="4557712"/>
           </a:xfrm>
         </p:spPr>
         <p:txBody>
@@ -10355,20 +11163,22 @@
           </a:bodyPr>
           <a:lstStyle/>
           <a:p>
-            <a:endParaRPr lang="en-US" altLang="zh-TW" sz="2400" dirty="0">
-              <a:latin typeface="Times New Roman" panose="02020603050405020304" pitchFamily="18" charset="0"/>
-              <a:ea typeface="標楷體" panose="03000509000000000000" pitchFamily="65" charset="-120"/>
-              <a:cs typeface="Times New Roman" panose="02020603050405020304" pitchFamily="18" charset="0"/>
-            </a:endParaRPr>
+            <a:r>
+              <a:rPr lang="en-US" altLang="zh-TW" sz="2000" dirty="0">
+                <a:cs typeface="Times New Roman" panose="02020603050405020304" pitchFamily="18" charset="0"/>
+              </a:rPr>
+              <a:t>Internal validation of algorithms using a nested resampling scheme and calibration</a:t>
+            </a:r>
+            <a:endParaRPr lang="en-US" sz="2000" dirty="0"/>
           </a:p>
         </p:txBody>
       </p:sp>
       <p:sp>
         <p:nvSpPr>
-          <p:cNvPr id="5" name="投影片編號版面配置區 4">
+          <p:cNvPr id="4" name="投影片編號版面配置區 3">
             <a:extLst>
               <a:ext uri="{FF2B5EF4-FFF2-40B4-BE49-F238E27FC236}">
-                <a16:creationId xmlns:a16="http://schemas.microsoft.com/office/drawing/2014/main" id="{6FDB81DD-25D0-4B7D-85DA-019476717276}"/>
+                <a16:creationId xmlns:a16="http://schemas.microsoft.com/office/drawing/2014/main" id="{0215B297-14CB-4790-8574-A3F756E6B81C}"/>
               </a:ext>
             </a:extLst>
           </p:cNvPr>
@@ -10385,25 +11195,105 @@
           <a:lstStyle/>
           <a:p>
             <a:fld id="{D2B5BE26-702C-4921-81E7-8AF275EDA2CC}" type="slidenum">
-              <a:rPr lang="zh-TW" altLang="en-US" smtClean="0">
-                <a:latin typeface="Times New Roman" panose="02020603050405020304" pitchFamily="18" charset="0"/>
-                <a:ea typeface="標楷體" panose="03000509000000000000" pitchFamily="65" charset="-120"/>
-                <a:cs typeface="Times New Roman" panose="02020603050405020304" pitchFamily="18" charset="0"/>
-              </a:rPr>
+              <a:rPr lang="zh-TW" altLang="en-US" smtClean="0"/>
+              <a:pPr/>
               <a:t>13</a:t>
             </a:fld>
-            <a:endParaRPr lang="zh-TW" altLang="en-US">
-              <a:latin typeface="Times New Roman" panose="02020603050405020304" pitchFamily="18" charset="0"/>
-              <a:ea typeface="標楷體" panose="03000509000000000000" pitchFamily="65" charset="-120"/>
-              <a:cs typeface="Times New Roman" panose="02020603050405020304" pitchFamily="18" charset="0"/>
-            </a:endParaRPr>
+            <a:endParaRPr lang="zh-TW" altLang="en-US"/>
           </a:p>
         </p:txBody>
       </p:sp>
+      <p:grpSp>
+        <p:nvGrpSpPr>
+          <p:cNvPr id="9" name="群組 8">
+            <a:extLst>
+              <a:ext uri="{FF2B5EF4-FFF2-40B4-BE49-F238E27FC236}">
+                <a16:creationId xmlns:a16="http://schemas.microsoft.com/office/drawing/2014/main" id="{CAD99246-5651-417E-9A23-434108E97ADC}"/>
+              </a:ext>
+            </a:extLst>
+          </p:cNvPr>
+          <p:cNvGrpSpPr/>
+          <p:nvPr/>
+        </p:nvGrpSpPr>
+        <p:grpSpPr>
+          <a:xfrm>
+            <a:off x="6096000" y="1554163"/>
+            <a:ext cx="5716113" cy="5167312"/>
+            <a:chOff x="6096000" y="1554163"/>
+            <a:chExt cx="5716113" cy="5167312"/>
+          </a:xfrm>
+        </p:grpSpPr>
+        <p:pic>
+          <p:nvPicPr>
+            <p:cNvPr id="6" name="圖片 5">
+              <a:extLst>
+                <a:ext uri="{FF2B5EF4-FFF2-40B4-BE49-F238E27FC236}">
+                  <a16:creationId xmlns:a16="http://schemas.microsoft.com/office/drawing/2014/main" id="{F9183CB5-98BD-47BF-AA5B-8378C26713CC}"/>
+                </a:ext>
+              </a:extLst>
+            </p:cNvPr>
+            <p:cNvPicPr>
+              <a:picLocks noChangeAspect="1"/>
+            </p:cNvPicPr>
+            <p:nvPr/>
+          </p:nvPicPr>
+          <p:blipFill>
+            <a:blip r:embed="rId3">
+              <a:extLst>
+                <a:ext uri="{28A0092B-C50C-407E-A947-70E740481C1C}">
+                  <a14:useLocalDpi xmlns:a14="http://schemas.microsoft.com/office/drawing/2010/main" val="0"/>
+                </a:ext>
+              </a:extLst>
+            </a:blip>
+            <a:stretch>
+              <a:fillRect/>
+            </a:stretch>
+          </p:blipFill>
+          <p:spPr>
+            <a:xfrm>
+              <a:off x="6096000" y="1554163"/>
+              <a:ext cx="5365593" cy="5167312"/>
+            </a:xfrm>
+            <a:prstGeom prst="rect">
+              <a:avLst/>
+            </a:prstGeom>
+          </p:spPr>
+        </p:pic>
+        <p:pic>
+          <p:nvPicPr>
+            <p:cNvPr id="7" name="圖片 6">
+              <a:extLst>
+                <a:ext uri="{FF2B5EF4-FFF2-40B4-BE49-F238E27FC236}">
+                  <a16:creationId xmlns:a16="http://schemas.microsoft.com/office/drawing/2014/main" id="{D69BE916-2698-49F9-85AE-54FB5A576D1C}"/>
+                </a:ext>
+              </a:extLst>
+            </p:cNvPr>
+            <p:cNvPicPr>
+              <a:picLocks noChangeAspect="1"/>
+            </p:cNvPicPr>
+            <p:nvPr/>
+          </p:nvPicPr>
+          <p:blipFill>
+            <a:blip r:embed="rId4"/>
+            <a:stretch>
+              <a:fillRect/>
+            </a:stretch>
+          </p:blipFill>
+          <p:spPr>
+            <a:xfrm>
+              <a:off x="11446353" y="1751648"/>
+              <a:ext cx="365760" cy="400930"/>
+            </a:xfrm>
+            <a:prstGeom prst="rect">
+              <a:avLst/>
+            </a:prstGeom>
+          </p:spPr>
+        </p:pic>
+      </p:grpSp>
     </p:spTree>
     <p:extLst>
       <p:ext uri="{BB962C8B-B14F-4D97-AF65-F5344CB8AC3E}">
-        <p14:creationId xmlns:p14="http://schemas.microsoft.com/office/powerpoint/2010/main" val="301353381"/>
+        <p14:creationId xmlns:p14="http://schemas.microsoft.com/office/powerpoint/2010/main" val="2964492281"/>
       </p:ext>
     </p:extLst>
   </p:cSld>
@@ -10457,52 +11347,13 @@
                 <a:ea typeface="標楷體" panose="03000509000000000000" pitchFamily="65" charset="-120"/>
                 <a:cs typeface="Times New Roman" panose="02020603050405020304" pitchFamily="18" charset="0"/>
               </a:rPr>
-              <a:t>Conclusion</a:t>
+              <a:t>Results and Comparisons</a:t>
             </a:r>
             <a:endParaRPr lang="zh-TW" altLang="en-US" dirty="0">
               <a:latin typeface="Times New Roman" panose="02020603050405020304" pitchFamily="18" charset="0"/>
               <a:ea typeface="標楷體" panose="03000509000000000000" pitchFamily="65" charset="-120"/>
               <a:cs typeface="Times New Roman" panose="02020603050405020304" pitchFamily="18" charset="0"/>
             </a:endParaRPr>
-          </a:p>
-        </p:txBody>
-      </p:sp>
-      <p:sp>
-        <p:nvSpPr>
-          <p:cNvPr id="3" name="內容版面配置區 2">
-            <a:extLst>
-              <a:ext uri="{FF2B5EF4-FFF2-40B4-BE49-F238E27FC236}">
-                <a16:creationId xmlns:a16="http://schemas.microsoft.com/office/drawing/2014/main" id="{7E658B3D-20B6-435E-B15B-C0553C4AE19F}"/>
-              </a:ext>
-            </a:extLst>
-          </p:cNvPr>
-          <p:cNvSpPr>
-            <a:spLocks noGrp="1"/>
-          </p:cNvSpPr>
-          <p:nvPr>
-            <p:ph idx="1"/>
-          </p:nvPr>
-        </p:nvSpPr>
-        <p:spPr>
-          <a:xfrm>
-            <a:off x="838200" y="1690688"/>
-            <a:ext cx="10515600" cy="4486275"/>
-          </a:xfrm>
-        </p:spPr>
-        <p:txBody>
-          <a:bodyPr>
-            <a:normAutofit/>
-          </a:bodyPr>
-          <a:lstStyle/>
-          <a:p>
-            <a:r>
-              <a:rPr lang="en-US" altLang="zh-TW" sz="2400" dirty="0">
-                <a:latin typeface="Times New Roman" panose="02020603050405020304" pitchFamily="18" charset="0"/>
-                <a:ea typeface="標楷體" panose="03000509000000000000" pitchFamily="65" charset="-120"/>
-                <a:cs typeface="Times New Roman" panose="02020603050405020304" pitchFamily="18" charset="0"/>
-              </a:rPr>
-              <a:t>Significance of the study</a:t>
-            </a:r>
           </a:p>
         </p:txBody>
       </p:sp>
@@ -10546,7 +11397,7 @@
     </p:spTree>
     <p:extLst>
       <p:ext uri="{BB962C8B-B14F-4D97-AF65-F5344CB8AC3E}">
-        <p14:creationId xmlns:p14="http://schemas.microsoft.com/office/powerpoint/2010/main" val="2996235149"/>
+        <p14:creationId xmlns:p14="http://schemas.microsoft.com/office/powerpoint/2010/main" val="2326381744"/>
       </p:ext>
     </p:extLst>
   </p:cSld>
@@ -10578,6 +11429,289 @@
           <p:cNvPr id="2" name="標題 1">
             <a:extLst>
               <a:ext uri="{FF2B5EF4-FFF2-40B4-BE49-F238E27FC236}">
+                <a16:creationId xmlns:a16="http://schemas.microsoft.com/office/drawing/2014/main" id="{7DC51965-3B55-4A2C-8171-E572382DD444}"/>
+              </a:ext>
+            </a:extLst>
+          </p:cNvPr>
+          <p:cNvSpPr>
+            <a:spLocks noGrp="1"/>
+          </p:cNvSpPr>
+          <p:nvPr>
+            <p:ph type="title"/>
+          </p:nvPr>
+        </p:nvSpPr>
+        <p:spPr/>
+        <p:txBody>
+          <a:bodyPr/>
+          <a:lstStyle/>
+          <a:p>
+            <a:r>
+              <a:rPr lang="en-US" altLang="zh-TW" dirty="0">
+                <a:latin typeface="Times New Roman" panose="02020603050405020304" pitchFamily="18" charset="0"/>
+                <a:ea typeface="標楷體" panose="03000509000000000000" pitchFamily="65" charset="-120"/>
+                <a:cs typeface="Times New Roman" panose="02020603050405020304" pitchFamily="18" charset="0"/>
+              </a:rPr>
+              <a:t>Analysis and Discussion</a:t>
+            </a:r>
+            <a:endParaRPr lang="zh-TW" altLang="en-US" dirty="0">
+              <a:latin typeface="Times New Roman" panose="02020603050405020304" pitchFamily="18" charset="0"/>
+              <a:ea typeface="標楷體" panose="03000509000000000000" pitchFamily="65" charset="-120"/>
+              <a:cs typeface="Times New Roman" panose="02020603050405020304" pitchFamily="18" charset="0"/>
+            </a:endParaRPr>
+          </a:p>
+        </p:txBody>
+      </p:sp>
+      <p:sp>
+        <p:nvSpPr>
+          <p:cNvPr id="3" name="內容版面配置區 2">
+            <a:extLst>
+              <a:ext uri="{FF2B5EF4-FFF2-40B4-BE49-F238E27FC236}">
+                <a16:creationId xmlns:a16="http://schemas.microsoft.com/office/drawing/2014/main" id="{7E658B3D-20B6-435E-B15B-C0553C4AE19F}"/>
+              </a:ext>
+            </a:extLst>
+          </p:cNvPr>
+          <p:cNvSpPr>
+            <a:spLocks noGrp="1"/>
+          </p:cNvSpPr>
+          <p:nvPr>
+            <p:ph idx="1"/>
+          </p:nvPr>
+        </p:nvSpPr>
+        <p:spPr>
+          <a:xfrm>
+            <a:off x="838200" y="1690688"/>
+            <a:ext cx="10515600" cy="4486275"/>
+          </a:xfrm>
+        </p:spPr>
+        <p:txBody>
+          <a:bodyPr>
+            <a:normAutofit/>
+          </a:bodyPr>
+          <a:lstStyle/>
+          <a:p>
+            <a:endParaRPr lang="en-US" altLang="zh-TW" sz="2400" dirty="0">
+              <a:latin typeface="Times New Roman" panose="02020603050405020304" pitchFamily="18" charset="0"/>
+              <a:ea typeface="標楷體" panose="03000509000000000000" pitchFamily="65" charset="-120"/>
+              <a:cs typeface="Times New Roman" panose="02020603050405020304" pitchFamily="18" charset="0"/>
+            </a:endParaRPr>
+          </a:p>
+        </p:txBody>
+      </p:sp>
+      <p:sp>
+        <p:nvSpPr>
+          <p:cNvPr id="5" name="投影片編號版面配置區 4">
+            <a:extLst>
+              <a:ext uri="{FF2B5EF4-FFF2-40B4-BE49-F238E27FC236}">
+                <a16:creationId xmlns:a16="http://schemas.microsoft.com/office/drawing/2014/main" id="{6FDB81DD-25D0-4B7D-85DA-019476717276}"/>
+              </a:ext>
+            </a:extLst>
+          </p:cNvPr>
+          <p:cNvSpPr>
+            <a:spLocks noGrp="1"/>
+          </p:cNvSpPr>
+          <p:nvPr>
+            <p:ph type="sldNum" sz="quarter" idx="12"/>
+          </p:nvPr>
+        </p:nvSpPr>
+        <p:spPr/>
+        <p:txBody>
+          <a:bodyPr/>
+          <a:lstStyle/>
+          <a:p>
+            <a:fld id="{D2B5BE26-702C-4921-81E7-8AF275EDA2CC}" type="slidenum">
+              <a:rPr lang="zh-TW" altLang="en-US" smtClean="0">
+                <a:latin typeface="Times New Roman" panose="02020603050405020304" pitchFamily="18" charset="0"/>
+                <a:ea typeface="標楷體" panose="03000509000000000000" pitchFamily="65" charset="-120"/>
+                <a:cs typeface="Times New Roman" panose="02020603050405020304" pitchFamily="18" charset="0"/>
+              </a:rPr>
+              <a:t>15</a:t>
+            </a:fld>
+            <a:endParaRPr lang="zh-TW" altLang="en-US">
+              <a:latin typeface="Times New Roman" panose="02020603050405020304" pitchFamily="18" charset="0"/>
+              <a:ea typeface="標楷體" panose="03000509000000000000" pitchFamily="65" charset="-120"/>
+              <a:cs typeface="Times New Roman" panose="02020603050405020304" pitchFamily="18" charset="0"/>
+            </a:endParaRPr>
+          </a:p>
+        </p:txBody>
+      </p:sp>
+    </p:spTree>
+    <p:extLst>
+      <p:ext uri="{BB962C8B-B14F-4D97-AF65-F5344CB8AC3E}">
+        <p14:creationId xmlns:p14="http://schemas.microsoft.com/office/powerpoint/2010/main" val="301353381"/>
+      </p:ext>
+    </p:extLst>
+  </p:cSld>
+  <p:clrMapOvr>
+    <a:masterClrMapping/>
+  </p:clrMapOvr>
+</p:sld>
+</file>
+
+<file path=ppt/slides/slide16.xml><?xml version="1.0" encoding="utf-8"?>
+<p:sld xmlns:a="http://schemas.openxmlformats.org/drawingml/2006/main" xmlns:r="http://schemas.openxmlformats.org/officeDocument/2006/relationships" xmlns:p="http://schemas.openxmlformats.org/presentationml/2006/main">
+  <p:cSld>
+    <p:spTree>
+      <p:nvGrpSpPr>
+        <p:cNvPr id="1" name=""/>
+        <p:cNvGrpSpPr/>
+        <p:nvPr/>
+      </p:nvGrpSpPr>
+      <p:grpSpPr>
+        <a:xfrm>
+          <a:off x="0" y="0"/>
+          <a:ext cx="0" cy="0"/>
+          <a:chOff x="0" y="0"/>
+          <a:chExt cx="0" cy="0"/>
+        </a:xfrm>
+      </p:grpSpPr>
+      <p:sp>
+        <p:nvSpPr>
+          <p:cNvPr id="2" name="標題 1">
+            <a:extLst>
+              <a:ext uri="{FF2B5EF4-FFF2-40B4-BE49-F238E27FC236}">
+                <a16:creationId xmlns:a16="http://schemas.microsoft.com/office/drawing/2014/main" id="{7DC51965-3B55-4A2C-8171-E572382DD444}"/>
+              </a:ext>
+            </a:extLst>
+          </p:cNvPr>
+          <p:cNvSpPr>
+            <a:spLocks noGrp="1"/>
+          </p:cNvSpPr>
+          <p:nvPr>
+            <p:ph type="title"/>
+          </p:nvPr>
+        </p:nvSpPr>
+        <p:spPr/>
+        <p:txBody>
+          <a:bodyPr/>
+          <a:lstStyle/>
+          <a:p>
+            <a:r>
+              <a:rPr lang="en-US" altLang="zh-TW" dirty="0">
+                <a:latin typeface="Times New Roman" panose="02020603050405020304" pitchFamily="18" charset="0"/>
+                <a:ea typeface="標楷體" panose="03000509000000000000" pitchFamily="65" charset="-120"/>
+                <a:cs typeface="Times New Roman" panose="02020603050405020304" pitchFamily="18" charset="0"/>
+              </a:rPr>
+              <a:t>Conclusion</a:t>
+            </a:r>
+            <a:endParaRPr lang="zh-TW" altLang="en-US" dirty="0">
+              <a:latin typeface="Times New Roman" panose="02020603050405020304" pitchFamily="18" charset="0"/>
+              <a:ea typeface="標楷體" panose="03000509000000000000" pitchFamily="65" charset="-120"/>
+              <a:cs typeface="Times New Roman" panose="02020603050405020304" pitchFamily="18" charset="0"/>
+            </a:endParaRPr>
+          </a:p>
+        </p:txBody>
+      </p:sp>
+      <p:sp>
+        <p:nvSpPr>
+          <p:cNvPr id="3" name="內容版面配置區 2">
+            <a:extLst>
+              <a:ext uri="{FF2B5EF4-FFF2-40B4-BE49-F238E27FC236}">
+                <a16:creationId xmlns:a16="http://schemas.microsoft.com/office/drawing/2014/main" id="{7E658B3D-20B6-435E-B15B-C0553C4AE19F}"/>
+              </a:ext>
+            </a:extLst>
+          </p:cNvPr>
+          <p:cNvSpPr>
+            <a:spLocks noGrp="1"/>
+          </p:cNvSpPr>
+          <p:nvPr>
+            <p:ph idx="1"/>
+          </p:nvPr>
+        </p:nvSpPr>
+        <p:spPr>
+          <a:xfrm>
+            <a:off x="838200" y="1690688"/>
+            <a:ext cx="10515600" cy="4486275"/>
+          </a:xfrm>
+        </p:spPr>
+        <p:txBody>
+          <a:bodyPr>
+            <a:normAutofit/>
+          </a:bodyPr>
+          <a:lstStyle/>
+          <a:p>
+            <a:r>
+              <a:rPr lang="en-US" altLang="zh-TW" sz="2400" dirty="0">
+                <a:latin typeface="Times New Roman" panose="02020603050405020304" pitchFamily="18" charset="0"/>
+                <a:ea typeface="標楷體" panose="03000509000000000000" pitchFamily="65" charset="-120"/>
+                <a:cs typeface="Times New Roman" panose="02020603050405020304" pitchFamily="18" charset="0"/>
+              </a:rPr>
+              <a:t>Significance of the study</a:t>
+            </a:r>
+          </a:p>
+        </p:txBody>
+      </p:sp>
+      <p:sp>
+        <p:nvSpPr>
+          <p:cNvPr id="5" name="投影片編號版面配置區 4">
+            <a:extLst>
+              <a:ext uri="{FF2B5EF4-FFF2-40B4-BE49-F238E27FC236}">
+                <a16:creationId xmlns:a16="http://schemas.microsoft.com/office/drawing/2014/main" id="{6FDB81DD-25D0-4B7D-85DA-019476717276}"/>
+              </a:ext>
+            </a:extLst>
+          </p:cNvPr>
+          <p:cNvSpPr>
+            <a:spLocks noGrp="1"/>
+          </p:cNvSpPr>
+          <p:nvPr>
+            <p:ph type="sldNum" sz="quarter" idx="12"/>
+          </p:nvPr>
+        </p:nvSpPr>
+        <p:spPr/>
+        <p:txBody>
+          <a:bodyPr/>
+          <a:lstStyle/>
+          <a:p>
+            <a:fld id="{D2B5BE26-702C-4921-81E7-8AF275EDA2CC}" type="slidenum">
+              <a:rPr lang="zh-TW" altLang="en-US" smtClean="0">
+                <a:latin typeface="Times New Roman" panose="02020603050405020304" pitchFamily="18" charset="0"/>
+                <a:ea typeface="標楷體" panose="03000509000000000000" pitchFamily="65" charset="-120"/>
+                <a:cs typeface="Times New Roman" panose="02020603050405020304" pitchFamily="18" charset="0"/>
+              </a:rPr>
+              <a:t>16</a:t>
+            </a:fld>
+            <a:endParaRPr lang="zh-TW" altLang="en-US">
+              <a:latin typeface="Times New Roman" panose="02020603050405020304" pitchFamily="18" charset="0"/>
+              <a:ea typeface="標楷體" panose="03000509000000000000" pitchFamily="65" charset="-120"/>
+              <a:cs typeface="Times New Roman" panose="02020603050405020304" pitchFamily="18" charset="0"/>
+            </a:endParaRPr>
+          </a:p>
+        </p:txBody>
+      </p:sp>
+    </p:spTree>
+    <p:extLst>
+      <p:ext uri="{BB962C8B-B14F-4D97-AF65-F5344CB8AC3E}">
+        <p14:creationId xmlns:p14="http://schemas.microsoft.com/office/powerpoint/2010/main" val="2996235149"/>
+      </p:ext>
+    </p:extLst>
+  </p:cSld>
+  <p:clrMapOvr>
+    <a:masterClrMapping/>
+  </p:clrMapOvr>
+</p:sld>
+</file>
+
+<file path=ppt/slides/slide17.xml><?xml version="1.0" encoding="utf-8"?>
+<p:sld xmlns:a="http://schemas.openxmlformats.org/drawingml/2006/main" xmlns:r="http://schemas.openxmlformats.org/officeDocument/2006/relationships" xmlns:p="http://schemas.openxmlformats.org/presentationml/2006/main">
+  <p:cSld>
+    <p:spTree>
+      <p:nvGrpSpPr>
+        <p:cNvPr id="1" name=""/>
+        <p:cNvGrpSpPr/>
+        <p:nvPr/>
+      </p:nvGrpSpPr>
+      <p:grpSpPr>
+        <a:xfrm>
+          <a:off x="0" y="0"/>
+          <a:ext cx="0" cy="0"/>
+          <a:chOff x="0" y="0"/>
+          <a:chExt cx="0" cy="0"/>
+        </a:xfrm>
+      </p:grpSpPr>
+      <p:sp>
+        <p:nvSpPr>
+          <p:cNvPr id="2" name="標題 1">
+            <a:extLst>
+              <a:ext uri="{FF2B5EF4-FFF2-40B4-BE49-F238E27FC236}">
                 <a16:creationId xmlns:a16="http://schemas.microsoft.com/office/drawing/2014/main" id="{8A89EAE4-5EE9-41CA-8A9C-C15FDEF0E7D2}"/>
               </a:ext>
             </a:extLst>
@@ -10700,7 +11834,7 @@
                 <a:ea typeface="標楷體" panose="03000509000000000000" pitchFamily="65" charset="-120"/>
                 <a:cs typeface="Times New Roman" panose="02020603050405020304" pitchFamily="18" charset="0"/>
               </a:rPr>
-              <a:t>15</a:t>
+              <a:t>17</a:t>
             </a:fld>
             <a:endParaRPr lang="zh-TW" altLang="en-US">
               <a:latin typeface="Times New Roman" panose="02020603050405020304" pitchFamily="18" charset="0"/>
@@ -11968,11 +13102,45 @@
               <a:p>
                 <a:r>
                   <a:rPr lang="en-US" altLang="zh-TW" sz="2400" dirty="0">
+                    <a:cs typeface="Times New Roman" panose="02020603050405020304" pitchFamily="18" charset="0"/>
+                  </a:rPr>
+                  <a:t>B</a:t>
+                </a:r>
+                <a:r>
+                  <a:rPr lang="en-US" altLang="zh-TW" sz="2400" dirty="0">
                     <a:latin typeface="Times New Roman" panose="02020603050405020304" pitchFamily="18" charset="0"/>
                     <a:ea typeface="標楷體" panose="03000509000000000000" pitchFamily="65" charset="-120"/>
                     <a:cs typeface="Times New Roman" panose="02020603050405020304" pitchFamily="18" charset="0"/>
                   </a:rPr>
-                  <a:t>brain tumor methylation data (BTMD)</a:t>
+                  <a:t>rain </a:t>
+                </a:r>
+                <a:r>
+                  <a:rPr lang="en-US" altLang="zh-TW" sz="2400" dirty="0">
+                    <a:cs typeface="Times New Roman" panose="02020603050405020304" pitchFamily="18" charset="0"/>
+                  </a:rPr>
+                  <a:t>T</a:t>
+                </a:r>
+                <a:r>
+                  <a:rPr lang="en-US" altLang="zh-TW" sz="2400" dirty="0">
+                    <a:latin typeface="Times New Roman" panose="02020603050405020304" pitchFamily="18" charset="0"/>
+                    <a:ea typeface="標楷體" panose="03000509000000000000" pitchFamily="65" charset="-120"/>
+                    <a:cs typeface="Times New Roman" panose="02020603050405020304" pitchFamily="18" charset="0"/>
+                  </a:rPr>
+                  <a:t>umor </a:t>
+                </a:r>
+                <a:r>
+                  <a:rPr lang="en-US" altLang="zh-TW" sz="2400" dirty="0">
+                    <a:cs typeface="Times New Roman" panose="02020603050405020304" pitchFamily="18" charset="0"/>
+                  </a:rPr>
+                  <a:t>M</a:t>
+                </a:r>
+                <a:r>
+                  <a:rPr lang="en-US" altLang="zh-TW" sz="2400" dirty="0">
+                    <a:latin typeface="Times New Roman" panose="02020603050405020304" pitchFamily="18" charset="0"/>
+                    <a:ea typeface="標楷體" panose="03000509000000000000" pitchFamily="65" charset="-120"/>
+                    <a:cs typeface="Times New Roman" panose="02020603050405020304" pitchFamily="18" charset="0"/>
+                  </a:rPr>
+                  <a:t>ethylation Data (BTMD)</a:t>
                 </a:r>
               </a:p>
               <a:p>
@@ -12077,6 +13245,27 @@
                   </a:rPr>
                   <a:t> = 143 (5.1%)</a:t>
                 </a:r>
+              </a:p>
+              <a:p>
+                <a:pPr lvl="1"/>
+                <a:r>
+                  <a:rPr lang="en-US" altLang="zh-TW" sz="2000" dirty="0">
+                    <a:cs typeface="Times New Roman" panose="02020603050405020304" pitchFamily="18" charset="0"/>
+                  </a:rPr>
+                  <a:t>BTMD is based on genome-wide quantitative measurements of DNA methylation at 485,577 CpG sites using Infinium HumanMethylation450 </a:t>
+                </a:r>
+                <a:r>
+                  <a:rPr lang="en-US" altLang="zh-TW" sz="2000" dirty="0" err="1">
+                    <a:cs typeface="Times New Roman" panose="02020603050405020304" pitchFamily="18" charset="0"/>
+                  </a:rPr>
+                  <a:t>BeadChip</a:t>
+                </a:r>
+                <a:r>
+                  <a:rPr lang="en-US" altLang="zh-TW" sz="2000" dirty="0">
+                    <a:cs typeface="Times New Roman" panose="02020603050405020304" pitchFamily="18" charset="0"/>
+                  </a:rPr>
+                  <a:t> technologies (450k; Illumina)</a:t>
+                </a:r>
                 <a:endParaRPr lang="en-US" altLang="zh-TW" sz="2000" dirty="0">
                   <a:latin typeface="Times New Roman" panose="02020603050405020304" pitchFamily="18" charset="0"/>
                   <a:ea typeface="標楷體" panose="03000509000000000000" pitchFamily="65" charset="-120"/>
@@ -12109,7 +13298,7 @@
                 <a:ext cx="10515600" cy="4486275"/>
               </a:xfrm>
               <a:blipFill>
-                <a:blip r:embed="rId2"/>
+                <a:blip r:embed="rId3"/>
                 <a:stretch>
                   <a:fillRect l="-812"/>
                 </a:stretch>

</xml_diff>